<commit_message>
Fixing missing color in slide
</commit_message>
<xml_diff>
--- a/presentation/Compressible States.pptx
+++ b/presentation/Compressible States.pptx
@@ -5536,7 +5536,7 @@
         </p:nvSpPr>
         <p:spPr>
           <a:xfrm>
-            <a:off x="568411" y="1984203"/>
+            <a:off x="568411" y="1934775"/>
             <a:ext cx="3382481" cy="1015663"/>
           </a:xfrm>
           <a:prstGeom prst="rect">
@@ -5659,8 +5659,8 @@
         </p:nvSpPr>
         <p:spPr>
           <a:xfrm>
-            <a:off x="568411" y="1984203"/>
-            <a:ext cx="3382481" cy="1015663"/>
+            <a:off x="568411" y="1934775"/>
+            <a:ext cx="3382481" cy="1323439"/>
           </a:xfrm>
           <a:prstGeom prst="rect">
             <a:avLst/>
@@ -5679,8 +5679,23 @@
             </a:pPr>
             <a:r>
               <a:rPr lang="en-US" sz="2000" dirty="0" smtClean="0"/>
-              <a:t>Blue: Original DCF</a:t>
-            </a:r>
+              <a:t>Blue: Original DCF Transmit</a:t>
+            </a:r>
+          </a:p>
+          <a:p>
+            <a:pPr marL="285750" indent="-285750">
+              <a:buFont typeface="Arial" panose="020B0604020202020204" pitchFamily="34" charset="0"/>
+              <a:buChar char="•"/>
+            </a:pPr>
+            <a:r>
+              <a:rPr lang="en-US" sz="2000" dirty="0" smtClean="0"/>
+              <a:t>Yellow: Original DCF </a:t>
+            </a:r>
+            <a:r>
+              <a:rPr lang="en-US" sz="2000" dirty="0" err="1" smtClean="0"/>
+              <a:t>Backoff</a:t>
+            </a:r>
+            <a:endParaRPr lang="en-US" sz="2000" dirty="0" smtClean="0"/>
           </a:p>
           <a:p>
             <a:pPr marL="285750" indent="-285750">
@@ -8054,8 +8069,8 @@
         </p:nvSpPr>
         <p:spPr>
           <a:xfrm>
-            <a:off x="568411" y="1984203"/>
-            <a:ext cx="3382481" cy="1323439"/>
+            <a:off x="568411" y="1934775"/>
+            <a:ext cx="3382481" cy="1631216"/>
           </a:xfrm>
           <a:prstGeom prst="rect">
             <a:avLst/>
@@ -8074,8 +8089,23 @@
             </a:pPr>
             <a:r>
               <a:rPr lang="en-US" sz="2000" dirty="0" smtClean="0"/>
-              <a:t>Blue: Original DCF</a:t>
-            </a:r>
+              <a:t>Blue: Original DCF Transmit</a:t>
+            </a:r>
+          </a:p>
+          <a:p>
+            <a:pPr marL="285750" indent="-285750">
+              <a:buFont typeface="Arial" panose="020B0604020202020204" pitchFamily="34" charset="0"/>
+              <a:buChar char="•"/>
+            </a:pPr>
+            <a:r>
+              <a:rPr lang="en-US" sz="2000" dirty="0" smtClean="0"/>
+              <a:t>Yellow: Original DCF </a:t>
+            </a:r>
+            <a:r>
+              <a:rPr lang="en-US" sz="2000" dirty="0" err="1" smtClean="0"/>
+              <a:t>Backoff</a:t>
+            </a:r>
+            <a:endParaRPr lang="en-US" sz="2000" dirty="0" smtClean="0"/>
           </a:p>
           <a:p>
             <a:pPr marL="285750" indent="-285750">

</xml_diff>